<commit_message>
Revise the visualisation of crash causation as part of bayesian network.
</commit_message>
<xml_diff>
--- a/figures/figure maker.pptx
+++ b/figures/figure maker.pptx
@@ -262,7 +262,7 @@
           <a:p>
             <a:fld id="{30641FAB-2934-4EFC-84B8-4ED3DB6CAFC6}" type="datetimeFigureOut">
               <a:rPr lang="sv-SE" smtClean="0"/>
-              <a:t>2020-08-14</a:t>
+              <a:t>2020-08-17</a:t>
             </a:fld>
             <a:endParaRPr lang="sv-SE"/>
           </a:p>
@@ -462,7 +462,7 @@
           <a:p>
             <a:fld id="{30641FAB-2934-4EFC-84B8-4ED3DB6CAFC6}" type="datetimeFigureOut">
               <a:rPr lang="sv-SE" smtClean="0"/>
-              <a:t>2020-08-14</a:t>
+              <a:t>2020-08-17</a:t>
             </a:fld>
             <a:endParaRPr lang="sv-SE"/>
           </a:p>
@@ -672,7 +672,7 @@
           <a:p>
             <a:fld id="{30641FAB-2934-4EFC-84B8-4ED3DB6CAFC6}" type="datetimeFigureOut">
               <a:rPr lang="sv-SE" smtClean="0"/>
-              <a:t>2020-08-14</a:t>
+              <a:t>2020-08-17</a:t>
             </a:fld>
             <a:endParaRPr lang="sv-SE"/>
           </a:p>
@@ -872,7 +872,7 @@
           <a:p>
             <a:fld id="{30641FAB-2934-4EFC-84B8-4ED3DB6CAFC6}" type="datetimeFigureOut">
               <a:rPr lang="sv-SE" smtClean="0"/>
-              <a:t>2020-08-14</a:t>
+              <a:t>2020-08-17</a:t>
             </a:fld>
             <a:endParaRPr lang="sv-SE"/>
           </a:p>
@@ -1148,7 +1148,7 @@
           <a:p>
             <a:fld id="{30641FAB-2934-4EFC-84B8-4ED3DB6CAFC6}" type="datetimeFigureOut">
               <a:rPr lang="sv-SE" smtClean="0"/>
-              <a:t>2020-08-14</a:t>
+              <a:t>2020-08-17</a:t>
             </a:fld>
             <a:endParaRPr lang="sv-SE"/>
           </a:p>
@@ -1416,7 +1416,7 @@
           <a:p>
             <a:fld id="{30641FAB-2934-4EFC-84B8-4ED3DB6CAFC6}" type="datetimeFigureOut">
               <a:rPr lang="sv-SE" smtClean="0"/>
-              <a:t>2020-08-14</a:t>
+              <a:t>2020-08-17</a:t>
             </a:fld>
             <a:endParaRPr lang="sv-SE"/>
           </a:p>
@@ -1831,7 +1831,7 @@
           <a:p>
             <a:fld id="{30641FAB-2934-4EFC-84B8-4ED3DB6CAFC6}" type="datetimeFigureOut">
               <a:rPr lang="sv-SE" smtClean="0"/>
-              <a:t>2020-08-14</a:t>
+              <a:t>2020-08-17</a:t>
             </a:fld>
             <a:endParaRPr lang="sv-SE"/>
           </a:p>
@@ -1973,7 +1973,7 @@
           <a:p>
             <a:fld id="{30641FAB-2934-4EFC-84B8-4ED3DB6CAFC6}" type="datetimeFigureOut">
               <a:rPr lang="sv-SE" smtClean="0"/>
-              <a:t>2020-08-14</a:t>
+              <a:t>2020-08-17</a:t>
             </a:fld>
             <a:endParaRPr lang="sv-SE"/>
           </a:p>
@@ -2086,7 +2086,7 @@
           <a:p>
             <a:fld id="{30641FAB-2934-4EFC-84B8-4ED3DB6CAFC6}" type="datetimeFigureOut">
               <a:rPr lang="sv-SE" smtClean="0"/>
-              <a:t>2020-08-14</a:t>
+              <a:t>2020-08-17</a:t>
             </a:fld>
             <a:endParaRPr lang="sv-SE"/>
           </a:p>
@@ -2399,7 +2399,7 @@
           <a:p>
             <a:fld id="{30641FAB-2934-4EFC-84B8-4ED3DB6CAFC6}" type="datetimeFigureOut">
               <a:rPr lang="sv-SE" smtClean="0"/>
-              <a:t>2020-08-14</a:t>
+              <a:t>2020-08-17</a:t>
             </a:fld>
             <a:endParaRPr lang="sv-SE"/>
           </a:p>
@@ -2688,7 +2688,7 @@
           <a:p>
             <a:fld id="{30641FAB-2934-4EFC-84B8-4ED3DB6CAFC6}" type="datetimeFigureOut">
               <a:rPr lang="sv-SE" smtClean="0"/>
-              <a:t>2020-08-14</a:t>
+              <a:t>2020-08-17</a:t>
             </a:fld>
             <a:endParaRPr lang="sv-SE"/>
           </a:p>
@@ -2931,7 +2931,7 @@
           <a:p>
             <a:fld id="{30641FAB-2934-4EFC-84B8-4ED3DB6CAFC6}" type="datetimeFigureOut">
               <a:rPr lang="sv-SE" smtClean="0"/>
-              <a:t>2020-08-14</a:t>
+              <a:t>2020-08-17</a:t>
             </a:fld>
             <a:endParaRPr lang="sv-SE"/>
           </a:p>
@@ -3674,57 +3674,21 @@
           </p:spPr>
         </p:pic>
       </p:grpSp>
-      <p:pic>
-        <p:nvPicPr>
-          <p:cNvPr id="14" name="Picture 13" descr="A screenshot of a cell phone&#10;&#10;Description automatically generated">
-            <a:extLst>
-              <a:ext uri="{FF2B5EF4-FFF2-40B4-BE49-F238E27FC236}">
-                <a16:creationId xmlns:a16="http://schemas.microsoft.com/office/drawing/2014/main" id="{FA60149B-DB33-4B09-B5F1-1E85E9E21D69}"/>
-              </a:ext>
-            </a:extLst>
-          </p:cNvPr>
-          <p:cNvPicPr>
-            <a:picLocks noChangeAspect="1"/>
-          </p:cNvPicPr>
+      <p:sp>
+        <p:nvSpPr>
+          <p:cNvPr id="15" name="TextBox 14">
+            <a:extLst>
+              <a:ext uri="{FF2B5EF4-FFF2-40B4-BE49-F238E27FC236}">
+                <a16:creationId xmlns:a16="http://schemas.microsoft.com/office/drawing/2014/main" id="{03E9F658-08AA-4DB4-9226-747616E1DD11}"/>
+              </a:ext>
+            </a:extLst>
+          </p:cNvPr>
+          <p:cNvSpPr txBox="1"/>
           <p:nvPr/>
-        </p:nvPicPr>
-        <p:blipFill>
-          <a:blip r:embed="rId4">
-            <a:extLst>
-              <a:ext uri="{28A0092B-C50C-407E-A947-70E740481C1C}">
-                <a14:useLocalDpi xmlns:a14="http://schemas.microsoft.com/office/drawing/2010/main" val="0"/>
-              </a:ext>
-            </a:extLst>
-          </a:blip>
-          <a:stretch>
-            <a:fillRect/>
-          </a:stretch>
-        </p:blipFill>
+        </p:nvSpPr>
         <p:spPr>
           <a:xfrm>
-            <a:off x="1545333" y="4442493"/>
-            <a:ext cx="6328544" cy="1582136"/>
-          </a:xfrm>
-          <a:prstGeom prst="rect">
-            <a:avLst/>
-          </a:prstGeom>
-        </p:spPr>
-      </p:pic>
-      <p:sp>
-        <p:nvSpPr>
-          <p:cNvPr id="15" name="TextBox 14">
-            <a:extLst>
-              <a:ext uri="{FF2B5EF4-FFF2-40B4-BE49-F238E27FC236}">
-                <a16:creationId xmlns:a16="http://schemas.microsoft.com/office/drawing/2014/main" id="{03E9F658-08AA-4DB4-9226-747616E1DD11}"/>
-              </a:ext>
-            </a:extLst>
-          </p:cNvPr>
-          <p:cNvSpPr txBox="1"/>
-          <p:nvPr/>
-        </p:nvSpPr>
-        <p:spPr>
-          <a:xfrm>
-            <a:off x="1546210" y="4288604"/>
+            <a:off x="7723760" y="1040822"/>
             <a:ext cx="298480" cy="307777"/>
           </a:xfrm>
           <a:prstGeom prst="rect">
@@ -3746,6 +3710,41 @@
           </a:p>
         </p:txBody>
       </p:sp>
+      <p:pic>
+        <p:nvPicPr>
+          <p:cNvPr id="7" name="Picture 6" descr="A screenshot of a cell phone&#10;&#10;Description automatically generated">
+            <a:extLst>
+              <a:ext uri="{FF2B5EF4-FFF2-40B4-BE49-F238E27FC236}">
+                <a16:creationId xmlns:a16="http://schemas.microsoft.com/office/drawing/2014/main" id="{1AB8DC26-297C-46A8-9E63-B99F8FF9FE0F}"/>
+              </a:ext>
+            </a:extLst>
+          </p:cNvPr>
+          <p:cNvPicPr>
+            <a:picLocks noChangeAspect="1"/>
+          </p:cNvPicPr>
+          <p:nvPr/>
+        </p:nvPicPr>
+        <p:blipFill rotWithShape="1">
+          <a:blip r:embed="rId4">
+            <a:extLst>
+              <a:ext uri="{28A0092B-C50C-407E-A947-70E740481C1C}">
+                <a14:useLocalDpi xmlns:a14="http://schemas.microsoft.com/office/drawing/2010/main" val="0"/>
+              </a:ext>
+            </a:extLst>
+          </a:blip>
+          <a:srcRect t="14048" b="13988"/>
+          <a:stretch/>
+        </p:blipFill>
+        <p:spPr>
+          <a:xfrm>
+            <a:off x="8022240" y="1139349"/>
+            <a:ext cx="2146378" cy="3089251"/>
+          </a:xfrm>
+          <a:prstGeom prst="rect">
+            <a:avLst/>
+          </a:prstGeom>
+        </p:spPr>
+      </p:pic>
     </p:spTree>
     <p:extLst>
       <p:ext uri="{BB962C8B-B14F-4D97-AF65-F5344CB8AC3E}">

</xml_diff>

<commit_message>
Revise the visualisation of Bayesian network.
</commit_message>
<xml_diff>
--- a/figures/figure maker.pptx
+++ b/figures/figure maker.pptx
@@ -7,6 +7,7 @@
   <p:sldIdLst>
     <p:sldId id="257" r:id="rId2"/>
     <p:sldId id="258" r:id="rId3"/>
+    <p:sldId id="259" r:id="rId4"/>
   </p:sldIdLst>
   <p:sldSz cx="12192000" cy="6858000"/>
   <p:notesSz cx="6858000" cy="9144000"/>
@@ -262,7 +263,7 @@
           <a:p>
             <a:fld id="{30641FAB-2934-4EFC-84B8-4ED3DB6CAFC6}" type="datetimeFigureOut">
               <a:rPr lang="sv-SE" smtClean="0"/>
-              <a:t>2020-08-17</a:t>
+              <a:t>2020-08-22</a:t>
             </a:fld>
             <a:endParaRPr lang="sv-SE"/>
           </a:p>
@@ -462,7 +463,7 @@
           <a:p>
             <a:fld id="{30641FAB-2934-4EFC-84B8-4ED3DB6CAFC6}" type="datetimeFigureOut">
               <a:rPr lang="sv-SE" smtClean="0"/>
-              <a:t>2020-08-17</a:t>
+              <a:t>2020-08-22</a:t>
             </a:fld>
             <a:endParaRPr lang="sv-SE"/>
           </a:p>
@@ -672,7 +673,7 @@
           <a:p>
             <a:fld id="{30641FAB-2934-4EFC-84B8-4ED3DB6CAFC6}" type="datetimeFigureOut">
               <a:rPr lang="sv-SE" smtClean="0"/>
-              <a:t>2020-08-17</a:t>
+              <a:t>2020-08-22</a:t>
             </a:fld>
             <a:endParaRPr lang="sv-SE"/>
           </a:p>
@@ -872,7 +873,7 @@
           <a:p>
             <a:fld id="{30641FAB-2934-4EFC-84B8-4ED3DB6CAFC6}" type="datetimeFigureOut">
               <a:rPr lang="sv-SE" smtClean="0"/>
-              <a:t>2020-08-17</a:t>
+              <a:t>2020-08-22</a:t>
             </a:fld>
             <a:endParaRPr lang="sv-SE"/>
           </a:p>
@@ -1148,7 +1149,7 @@
           <a:p>
             <a:fld id="{30641FAB-2934-4EFC-84B8-4ED3DB6CAFC6}" type="datetimeFigureOut">
               <a:rPr lang="sv-SE" smtClean="0"/>
-              <a:t>2020-08-17</a:t>
+              <a:t>2020-08-22</a:t>
             </a:fld>
             <a:endParaRPr lang="sv-SE"/>
           </a:p>
@@ -1416,7 +1417,7 @@
           <a:p>
             <a:fld id="{30641FAB-2934-4EFC-84B8-4ED3DB6CAFC6}" type="datetimeFigureOut">
               <a:rPr lang="sv-SE" smtClean="0"/>
-              <a:t>2020-08-17</a:t>
+              <a:t>2020-08-22</a:t>
             </a:fld>
             <a:endParaRPr lang="sv-SE"/>
           </a:p>
@@ -1831,7 +1832,7 @@
           <a:p>
             <a:fld id="{30641FAB-2934-4EFC-84B8-4ED3DB6CAFC6}" type="datetimeFigureOut">
               <a:rPr lang="sv-SE" smtClean="0"/>
-              <a:t>2020-08-17</a:t>
+              <a:t>2020-08-22</a:t>
             </a:fld>
             <a:endParaRPr lang="sv-SE"/>
           </a:p>
@@ -1973,7 +1974,7 @@
           <a:p>
             <a:fld id="{30641FAB-2934-4EFC-84B8-4ED3DB6CAFC6}" type="datetimeFigureOut">
               <a:rPr lang="sv-SE" smtClean="0"/>
-              <a:t>2020-08-17</a:t>
+              <a:t>2020-08-22</a:t>
             </a:fld>
             <a:endParaRPr lang="sv-SE"/>
           </a:p>
@@ -2086,7 +2087,7 @@
           <a:p>
             <a:fld id="{30641FAB-2934-4EFC-84B8-4ED3DB6CAFC6}" type="datetimeFigureOut">
               <a:rPr lang="sv-SE" smtClean="0"/>
-              <a:t>2020-08-17</a:t>
+              <a:t>2020-08-22</a:t>
             </a:fld>
             <a:endParaRPr lang="sv-SE"/>
           </a:p>
@@ -2399,7 +2400,7 @@
           <a:p>
             <a:fld id="{30641FAB-2934-4EFC-84B8-4ED3DB6CAFC6}" type="datetimeFigureOut">
               <a:rPr lang="sv-SE" smtClean="0"/>
-              <a:t>2020-08-17</a:t>
+              <a:t>2020-08-22</a:t>
             </a:fld>
             <a:endParaRPr lang="sv-SE"/>
           </a:p>
@@ -2688,7 +2689,7 @@
           <a:p>
             <a:fld id="{30641FAB-2934-4EFC-84B8-4ED3DB6CAFC6}" type="datetimeFigureOut">
               <a:rPr lang="sv-SE" smtClean="0"/>
-              <a:t>2020-08-17</a:t>
+              <a:t>2020-08-22</a:t>
             </a:fld>
             <a:endParaRPr lang="sv-SE"/>
           </a:p>
@@ -2931,7 +2932,7 @@
           <a:p>
             <a:fld id="{30641FAB-2934-4EFC-84B8-4ED3DB6CAFC6}" type="datetimeFigureOut">
               <a:rPr lang="sv-SE" smtClean="0"/>
-              <a:t>2020-08-17</a:t>
+              <a:t>2020-08-22</a:t>
             </a:fld>
             <a:endParaRPr lang="sv-SE"/>
           </a:p>
@@ -3758,6 +3759,178 @@
 </p:sld>
 </file>
 
+<file path=ppt/slides/slide3.xml><?xml version="1.0" encoding="utf-8"?>
+<p:sld xmlns:a="http://schemas.openxmlformats.org/drawingml/2006/main" xmlns:r="http://schemas.openxmlformats.org/officeDocument/2006/relationships" xmlns:p="http://schemas.openxmlformats.org/presentationml/2006/main">
+  <p:cSld>
+    <p:spTree>
+      <p:nvGrpSpPr>
+        <p:cNvPr id="1" name=""/>
+        <p:cNvGrpSpPr/>
+        <p:nvPr/>
+      </p:nvGrpSpPr>
+      <p:grpSpPr>
+        <a:xfrm>
+          <a:off x="0" y="0"/>
+          <a:ext cx="0" cy="0"/>
+          <a:chOff x="0" y="0"/>
+          <a:chExt cx="0" cy="0"/>
+        </a:xfrm>
+      </p:grpSpPr>
+      <p:sp>
+        <p:nvSpPr>
+          <p:cNvPr id="4" name="TextBox 3">
+            <a:extLst>
+              <a:ext uri="{FF2B5EF4-FFF2-40B4-BE49-F238E27FC236}">
+                <a16:creationId xmlns:a16="http://schemas.microsoft.com/office/drawing/2014/main" id="{7DB327D5-B20E-4BF0-988C-E862D1FA6BB7}"/>
+              </a:ext>
+            </a:extLst>
+          </p:cNvPr>
+          <p:cNvSpPr txBox="1"/>
+          <p:nvPr/>
+        </p:nvSpPr>
+        <p:spPr>
+          <a:xfrm>
+            <a:off x="1844690" y="1040822"/>
+            <a:ext cx="298480" cy="307777"/>
+          </a:xfrm>
+          <a:prstGeom prst="rect">
+            <a:avLst/>
+          </a:prstGeom>
+          <a:noFill/>
+        </p:spPr>
+        <p:txBody>
+          <a:bodyPr wrap="square" rtlCol="0">
+            <a:spAutoFit/>
+          </a:bodyPr>
+          <a:lstStyle/>
+          <a:p>
+            <a:r>
+              <a:rPr lang="en-US" sz="1400" b="1" dirty="0"/>
+              <a:t>a</a:t>
+            </a:r>
+            <a:endParaRPr lang="sv-SE" sz="1400" b="1" dirty="0"/>
+          </a:p>
+        </p:txBody>
+      </p:sp>
+      <p:sp>
+        <p:nvSpPr>
+          <p:cNvPr id="5" name="TextBox 4">
+            <a:extLst>
+              <a:ext uri="{FF2B5EF4-FFF2-40B4-BE49-F238E27FC236}">
+                <a16:creationId xmlns:a16="http://schemas.microsoft.com/office/drawing/2014/main" id="{FD46D555-81C2-4EC9-B977-92B10826C612}"/>
+              </a:ext>
+            </a:extLst>
+          </p:cNvPr>
+          <p:cNvSpPr txBox="1"/>
+          <p:nvPr/>
+        </p:nvSpPr>
+        <p:spPr>
+          <a:xfrm>
+            <a:off x="5153729" y="1040821"/>
+            <a:ext cx="280846" cy="307777"/>
+          </a:xfrm>
+          <a:prstGeom prst="rect">
+            <a:avLst/>
+          </a:prstGeom>
+          <a:noFill/>
+        </p:spPr>
+        <p:txBody>
+          <a:bodyPr wrap="none" rtlCol="0">
+            <a:spAutoFit/>
+          </a:bodyPr>
+          <a:lstStyle/>
+          <a:p>
+            <a:r>
+              <a:rPr lang="en-US" sz="1400" b="1" dirty="0"/>
+              <a:t>b</a:t>
+            </a:r>
+            <a:endParaRPr lang="sv-SE" sz="1400" b="1" dirty="0"/>
+          </a:p>
+        </p:txBody>
+      </p:sp>
+      <p:pic>
+        <p:nvPicPr>
+          <p:cNvPr id="16" name="Picture 15" descr="A close up of a map&#10;&#10;Description automatically generated">
+            <a:extLst>
+              <a:ext uri="{FF2B5EF4-FFF2-40B4-BE49-F238E27FC236}">
+                <a16:creationId xmlns:a16="http://schemas.microsoft.com/office/drawing/2014/main" id="{D2EAE3C0-6484-4DEC-85C6-94028BD89390}"/>
+              </a:ext>
+            </a:extLst>
+          </p:cNvPr>
+          <p:cNvPicPr>
+            <a:picLocks noChangeAspect="1"/>
+          </p:cNvPicPr>
+          <p:nvPr/>
+        </p:nvPicPr>
+        <p:blipFill rotWithShape="1">
+          <a:blip r:embed="rId2">
+            <a:extLst>
+              <a:ext uri="{28A0092B-C50C-407E-A947-70E740481C1C}">
+                <a14:useLocalDpi xmlns:a14="http://schemas.microsoft.com/office/drawing/2010/main" val="0"/>
+              </a:ext>
+            </a:extLst>
+          </a:blip>
+          <a:srcRect l="13675" t="18453" r="7980" b="22084"/>
+          <a:stretch/>
+        </p:blipFill>
+        <p:spPr>
+          <a:xfrm>
+            <a:off x="1844690" y="1348600"/>
+            <a:ext cx="3251891" cy="2160000"/>
+          </a:xfrm>
+          <a:prstGeom prst="rect">
+            <a:avLst/>
+          </a:prstGeom>
+        </p:spPr>
+      </p:pic>
+      <p:pic>
+        <p:nvPicPr>
+          <p:cNvPr id="22" name="Picture 21">
+            <a:extLst>
+              <a:ext uri="{FF2B5EF4-FFF2-40B4-BE49-F238E27FC236}">
+                <a16:creationId xmlns:a16="http://schemas.microsoft.com/office/drawing/2014/main" id="{0101D815-AE5D-4F76-8709-832A7D39E979}"/>
+              </a:ext>
+            </a:extLst>
+          </p:cNvPr>
+          <p:cNvPicPr>
+            <a:picLocks noChangeAspect="1"/>
+          </p:cNvPicPr>
+          <p:nvPr/>
+        </p:nvPicPr>
+        <p:blipFill rotWithShape="1">
+          <a:blip r:embed="rId3">
+            <a:extLst>
+              <a:ext uri="{28A0092B-C50C-407E-A947-70E740481C1C}">
+                <a14:useLocalDpi xmlns:a14="http://schemas.microsoft.com/office/drawing/2010/main" val="0"/>
+              </a:ext>
+            </a:extLst>
+          </a:blip>
+          <a:srcRect t="11697" b="12589"/>
+          <a:stretch/>
+        </p:blipFill>
+        <p:spPr>
+          <a:xfrm>
+            <a:off x="5153729" y="1348599"/>
+            <a:ext cx="5705672" cy="2160000"/>
+          </a:xfrm>
+          <a:prstGeom prst="rect">
+            <a:avLst/>
+          </a:prstGeom>
+        </p:spPr>
+      </p:pic>
+    </p:spTree>
+    <p:extLst>
+      <p:ext uri="{BB962C8B-B14F-4D97-AF65-F5344CB8AC3E}">
+        <p14:creationId xmlns:p14="http://schemas.microsoft.com/office/powerpoint/2010/main" val="2169038099"/>
+      </p:ext>
+    </p:extLst>
+  </p:cSld>
+  <p:clrMapOvr>
+    <a:masterClrMapping/>
+  </p:clrMapOvr>
+</p:sld>
+</file>
+
 <file path=ppt/theme/theme1.xml><?xml version="1.0" encoding="utf-8"?>
 <a:theme xmlns:a="http://schemas.openxmlformats.org/drawingml/2006/main" name="Office Theme">
   <a:themeElements>

</xml_diff>